<commit_message>
corrección de los pitches
</commit_message>
<xml_diff>
--- a/08_pitches/TeleAssist_Pitch_Deck_Inversores.pptx
+++ b/08_pitches/TeleAssist_Pitch_Deck_Inversores.pptx
@@ -5,19 +5,19 @@
     <p:sldMasterId id="2147483648" r:id="rId1"/>
   </p:sldMasterIdLst>
   <p:sldIdLst>
-    <p:sldId id="256" r:id="rId7"/>
-    <p:sldId id="257" r:id="rId8"/>
-    <p:sldId id="258" r:id="rId9"/>
-    <p:sldId id="259" r:id="rId10"/>
-    <p:sldId id="260" r:id="rId11"/>
-    <p:sldId id="261" r:id="rId12"/>
-    <p:sldId id="262" r:id="rId13"/>
-    <p:sldId id="263" r:id="rId14"/>
-    <p:sldId id="264" r:id="rId15"/>
-    <p:sldId id="265" r:id="rId16"/>
-    <p:sldId id="266" r:id="rId17"/>
+    <p:sldId id="256" r:id="rId2"/>
+    <p:sldId id="257" r:id="rId3"/>
+    <p:sldId id="258" r:id="rId4"/>
+    <p:sldId id="259" r:id="rId5"/>
+    <p:sldId id="260" r:id="rId6"/>
+    <p:sldId id="261" r:id="rId7"/>
+    <p:sldId id="262" r:id="rId8"/>
+    <p:sldId id="263" r:id="rId9"/>
+    <p:sldId id="264" r:id="rId10"/>
+    <p:sldId id="265" r:id="rId11"/>
+    <p:sldId id="266" r:id="rId12"/>
   </p:sldIdLst>
-  <p:sldSz cx="14630400" cy="8229600" type="screen4x3"/>
+  <p:sldSz cx="14630400" cy="8229600"/>
   <p:notesSz cx="6858000" cy="9144000"/>
   <p:defaultTextStyle>
     <a:defPPr>
@@ -114,6 +114,22 @@
       </a:defRPr>
     </a:lvl9pPr>
   </p:defaultTextStyle>
+  <p:extLst>
+    <p:ext uri="{EFAFB233-063F-42B5-8137-9DF3F51BA10A}">
+      <p15:sldGuideLst xmlns:p15="http://schemas.microsoft.com/office/powerpoint/2012/main">
+        <p15:guide id="1" orient="horz" pos="2160">
+          <p15:clr>
+            <a:srgbClr val="A4A3A4"/>
+          </p15:clr>
+        </p15:guide>
+        <p15:guide id="2" pos="2880">
+          <p15:clr>
+            <a:srgbClr val="A4A3A4"/>
+          </p15:clr>
+        </p15:guide>
+      </p15:sldGuideLst>
+    </p:ext>
+  </p:extLst>
 </p:presentation>
 </file>
 
@@ -155,10 +171,9 @@
           <a:lstStyle/>
           <a:p>
             <a:r>
-              <a:rPr lang="en-US" smtClean="0"/>
+              <a:rPr lang="en-US"/>
               <a:t>Click to edit Master title style</a:t>
             </a:r>
-            <a:endParaRPr lang="en-US"/>
           </a:p>
         </p:txBody>
       </p:sp>
@@ -274,10 +289,9 @@
           </a:lstStyle>
           <a:p>
             <a:r>
-              <a:rPr lang="en-US" smtClean="0"/>
+              <a:rPr lang="en-US"/>
               <a:t>Click to edit Master subtitle style</a:t>
             </a:r>
-            <a:endParaRPr lang="en-US"/>
           </a:p>
         </p:txBody>
       </p:sp>
@@ -298,7 +312,7 @@
           <a:p>
             <a:fld id="{5BCAD085-E8A6-8845-BD4E-CB4CCA059FC4}" type="datetimeFigureOut">
               <a:rPr lang="en-US" smtClean="0"/>
-              <a:t>1/27/13</a:t>
+              <a:t>11/9/2025</a:t>
             </a:fld>
             <a:endParaRPr lang="en-US"/>
           </a:p>
@@ -392,10 +406,9 @@
           <a:lstStyle/>
           <a:p>
             <a:r>
-              <a:rPr lang="en-US" smtClean="0"/>
+              <a:rPr lang="en-US"/>
               <a:t>Click to edit Master title style</a:t>
             </a:r>
-            <a:endParaRPr lang="en-US"/>
           </a:p>
         </p:txBody>
       </p:sp>
@@ -416,38 +429,37 @@
           <a:p>
             <a:pPr lvl="0"/>
             <a:r>
-              <a:rPr lang="en-US" smtClean="0"/>
+              <a:rPr lang="en-US"/>
               <a:t>Click to edit Master text styles</a:t>
             </a:r>
           </a:p>
           <a:p>
             <a:pPr lvl="1"/>
             <a:r>
-              <a:rPr lang="en-US" smtClean="0"/>
+              <a:rPr lang="en-US"/>
               <a:t>Second level</a:t>
             </a:r>
           </a:p>
           <a:p>
             <a:pPr lvl="2"/>
             <a:r>
-              <a:rPr lang="en-US" smtClean="0"/>
+              <a:rPr lang="en-US"/>
               <a:t>Third level</a:t>
             </a:r>
           </a:p>
           <a:p>
             <a:pPr lvl="3"/>
             <a:r>
-              <a:rPr lang="en-US" smtClean="0"/>
+              <a:rPr lang="en-US"/>
               <a:t>Fourth level</a:t>
             </a:r>
           </a:p>
           <a:p>
             <a:pPr lvl="4"/>
             <a:r>
-              <a:rPr lang="en-US" smtClean="0"/>
+              <a:rPr lang="en-US"/>
               <a:t>Fifth level</a:t>
             </a:r>
-            <a:endParaRPr lang="en-US"/>
           </a:p>
         </p:txBody>
       </p:sp>
@@ -468,7 +480,7 @@
           <a:p>
             <a:fld id="{5BCAD085-E8A6-8845-BD4E-CB4CCA059FC4}" type="datetimeFigureOut">
               <a:rPr lang="en-US" smtClean="0"/>
-              <a:t>1/27/13</a:t>
+              <a:t>11/9/2025</a:t>
             </a:fld>
             <a:endParaRPr lang="en-US"/>
           </a:p>
@@ -567,10 +579,9 @@
           <a:lstStyle/>
           <a:p>
             <a:r>
-              <a:rPr lang="en-US" smtClean="0"/>
+              <a:rPr lang="en-US"/>
               <a:t>Click to edit Master title style</a:t>
             </a:r>
-            <a:endParaRPr lang="en-US"/>
           </a:p>
         </p:txBody>
       </p:sp>
@@ -596,38 +607,37 @@
           <a:p>
             <a:pPr lvl="0"/>
             <a:r>
-              <a:rPr lang="en-US" smtClean="0"/>
+              <a:rPr lang="en-US"/>
               <a:t>Click to edit Master text styles</a:t>
             </a:r>
           </a:p>
           <a:p>
             <a:pPr lvl="1"/>
             <a:r>
-              <a:rPr lang="en-US" smtClean="0"/>
+              <a:rPr lang="en-US"/>
               <a:t>Second level</a:t>
             </a:r>
           </a:p>
           <a:p>
             <a:pPr lvl="2"/>
             <a:r>
-              <a:rPr lang="en-US" smtClean="0"/>
+              <a:rPr lang="en-US"/>
               <a:t>Third level</a:t>
             </a:r>
           </a:p>
           <a:p>
             <a:pPr lvl="3"/>
             <a:r>
-              <a:rPr lang="en-US" smtClean="0"/>
+              <a:rPr lang="en-US"/>
               <a:t>Fourth level</a:t>
             </a:r>
           </a:p>
           <a:p>
             <a:pPr lvl="4"/>
             <a:r>
-              <a:rPr lang="en-US" smtClean="0"/>
+              <a:rPr lang="en-US"/>
               <a:t>Fifth level</a:t>
             </a:r>
-            <a:endParaRPr lang="en-US"/>
           </a:p>
         </p:txBody>
       </p:sp>
@@ -648,7 +658,7 @@
           <a:p>
             <a:fld id="{5BCAD085-E8A6-8845-BD4E-CB4CCA059FC4}" type="datetimeFigureOut">
               <a:rPr lang="en-US" smtClean="0"/>
-              <a:t>1/27/13</a:t>
+              <a:t>11/9/2025</a:t>
             </a:fld>
             <a:endParaRPr lang="en-US"/>
           </a:p>
@@ -742,10 +752,9 @@
           <a:lstStyle/>
           <a:p>
             <a:r>
-              <a:rPr lang="en-US" smtClean="0"/>
+              <a:rPr lang="en-US"/>
               <a:t>Click to edit Master title style</a:t>
             </a:r>
-            <a:endParaRPr lang="en-US"/>
           </a:p>
         </p:txBody>
       </p:sp>
@@ -766,38 +775,37 @@
           <a:p>
             <a:pPr lvl="0"/>
             <a:r>
-              <a:rPr lang="en-US" smtClean="0"/>
+              <a:rPr lang="en-US"/>
               <a:t>Click to edit Master text styles</a:t>
             </a:r>
           </a:p>
           <a:p>
             <a:pPr lvl="1"/>
             <a:r>
-              <a:rPr lang="en-US" smtClean="0"/>
+              <a:rPr lang="en-US"/>
               <a:t>Second level</a:t>
             </a:r>
           </a:p>
           <a:p>
             <a:pPr lvl="2"/>
             <a:r>
-              <a:rPr lang="en-US" smtClean="0"/>
+              <a:rPr lang="en-US"/>
               <a:t>Third level</a:t>
             </a:r>
           </a:p>
           <a:p>
             <a:pPr lvl="3"/>
             <a:r>
-              <a:rPr lang="en-US" smtClean="0"/>
+              <a:rPr lang="en-US"/>
               <a:t>Fourth level</a:t>
             </a:r>
           </a:p>
           <a:p>
             <a:pPr lvl="4"/>
             <a:r>
-              <a:rPr lang="en-US" smtClean="0"/>
+              <a:rPr lang="en-US"/>
               <a:t>Fifth level</a:t>
             </a:r>
-            <a:endParaRPr lang="en-US"/>
           </a:p>
         </p:txBody>
       </p:sp>
@@ -818,7 +826,7 @@
           <a:p>
             <a:fld id="{5BCAD085-E8A6-8845-BD4E-CB4CCA059FC4}" type="datetimeFigureOut">
               <a:rPr lang="en-US" smtClean="0"/>
-              <a:t>1/27/13</a:t>
+              <a:t>11/9/2025</a:t>
             </a:fld>
             <a:endParaRPr lang="en-US"/>
           </a:p>
@@ -921,10 +929,9 @@
           </a:lstStyle>
           <a:p>
             <a:r>
-              <a:rPr lang="en-US" smtClean="0"/>
+              <a:rPr lang="en-US"/>
               <a:t>Click to edit Master title style</a:t>
             </a:r>
-            <a:endParaRPr lang="en-US"/>
           </a:p>
         </p:txBody>
       </p:sp>
@@ -1041,7 +1048,7 @@
           <a:p>
             <a:pPr lvl="0"/>
             <a:r>
-              <a:rPr lang="en-US" smtClean="0"/>
+              <a:rPr lang="en-US"/>
               <a:t>Click to edit Master text styles</a:t>
             </a:r>
           </a:p>
@@ -1064,7 +1071,7 @@
           <a:p>
             <a:fld id="{5BCAD085-E8A6-8845-BD4E-CB4CCA059FC4}" type="datetimeFigureOut">
               <a:rPr lang="en-US" smtClean="0"/>
-              <a:t>1/27/13</a:t>
+              <a:t>11/9/2025</a:t>
             </a:fld>
             <a:endParaRPr lang="en-US"/>
           </a:p>
@@ -1158,10 +1165,9 @@
           <a:lstStyle/>
           <a:p>
             <a:r>
-              <a:rPr lang="en-US" smtClean="0"/>
+              <a:rPr lang="en-US"/>
               <a:t>Click to edit Master title style</a:t>
             </a:r>
-            <a:endParaRPr lang="en-US"/>
           </a:p>
         </p:txBody>
       </p:sp>
@@ -1215,38 +1221,37 @@
           <a:p>
             <a:pPr lvl="0"/>
             <a:r>
-              <a:rPr lang="en-US" smtClean="0"/>
+              <a:rPr lang="en-US"/>
               <a:t>Click to edit Master text styles</a:t>
             </a:r>
           </a:p>
           <a:p>
             <a:pPr lvl="1"/>
             <a:r>
-              <a:rPr lang="en-US" smtClean="0"/>
+              <a:rPr lang="en-US"/>
               <a:t>Second level</a:t>
             </a:r>
           </a:p>
           <a:p>
             <a:pPr lvl="2"/>
             <a:r>
-              <a:rPr lang="en-US" smtClean="0"/>
+              <a:rPr lang="en-US"/>
               <a:t>Third level</a:t>
             </a:r>
           </a:p>
           <a:p>
             <a:pPr lvl="3"/>
             <a:r>
-              <a:rPr lang="en-US" smtClean="0"/>
+              <a:rPr lang="en-US"/>
               <a:t>Fourth level</a:t>
             </a:r>
           </a:p>
           <a:p>
             <a:pPr lvl="4"/>
             <a:r>
-              <a:rPr lang="en-US" smtClean="0"/>
+              <a:rPr lang="en-US"/>
               <a:t>Fifth level</a:t>
             </a:r>
-            <a:endParaRPr lang="en-US"/>
           </a:p>
         </p:txBody>
       </p:sp>
@@ -1300,38 +1305,37 @@
           <a:p>
             <a:pPr lvl="0"/>
             <a:r>
-              <a:rPr lang="en-US" smtClean="0"/>
+              <a:rPr lang="en-US"/>
               <a:t>Click to edit Master text styles</a:t>
             </a:r>
           </a:p>
           <a:p>
             <a:pPr lvl="1"/>
             <a:r>
-              <a:rPr lang="en-US" smtClean="0"/>
+              <a:rPr lang="en-US"/>
               <a:t>Second level</a:t>
             </a:r>
           </a:p>
           <a:p>
             <a:pPr lvl="2"/>
             <a:r>
-              <a:rPr lang="en-US" smtClean="0"/>
+              <a:rPr lang="en-US"/>
               <a:t>Third level</a:t>
             </a:r>
           </a:p>
           <a:p>
             <a:pPr lvl="3"/>
             <a:r>
-              <a:rPr lang="en-US" smtClean="0"/>
+              <a:rPr lang="en-US"/>
               <a:t>Fourth level</a:t>
             </a:r>
           </a:p>
           <a:p>
             <a:pPr lvl="4"/>
             <a:r>
-              <a:rPr lang="en-US" smtClean="0"/>
+              <a:rPr lang="en-US"/>
               <a:t>Fifth level</a:t>
             </a:r>
-            <a:endParaRPr lang="en-US"/>
           </a:p>
         </p:txBody>
       </p:sp>
@@ -1352,7 +1356,7 @@
           <a:p>
             <a:fld id="{5BCAD085-E8A6-8845-BD4E-CB4CCA059FC4}" type="datetimeFigureOut">
               <a:rPr lang="en-US" smtClean="0"/>
-              <a:t>1/27/13</a:t>
+              <a:t>11/9/2025</a:t>
             </a:fld>
             <a:endParaRPr lang="en-US"/>
           </a:p>
@@ -1450,10 +1454,9 @@
           </a:lstStyle>
           <a:p>
             <a:r>
-              <a:rPr lang="en-US" smtClean="0"/>
+              <a:rPr lang="en-US"/>
               <a:t>Click to edit Master title style</a:t>
             </a:r>
-            <a:endParaRPr lang="en-US"/>
           </a:p>
         </p:txBody>
       </p:sp>
@@ -1516,7 +1519,7 @@
           <a:p>
             <a:pPr lvl="0"/>
             <a:r>
-              <a:rPr lang="en-US" smtClean="0"/>
+              <a:rPr lang="en-US"/>
               <a:t>Click to edit Master text styles</a:t>
             </a:r>
           </a:p>
@@ -1572,38 +1575,37 @@
           <a:p>
             <a:pPr lvl="0"/>
             <a:r>
-              <a:rPr lang="en-US" smtClean="0"/>
+              <a:rPr lang="en-US"/>
               <a:t>Click to edit Master text styles</a:t>
             </a:r>
           </a:p>
           <a:p>
             <a:pPr lvl="1"/>
             <a:r>
-              <a:rPr lang="en-US" smtClean="0"/>
+              <a:rPr lang="en-US"/>
               <a:t>Second level</a:t>
             </a:r>
           </a:p>
           <a:p>
             <a:pPr lvl="2"/>
             <a:r>
-              <a:rPr lang="en-US" smtClean="0"/>
+              <a:rPr lang="en-US"/>
               <a:t>Third level</a:t>
             </a:r>
           </a:p>
           <a:p>
             <a:pPr lvl="3"/>
             <a:r>
-              <a:rPr lang="en-US" smtClean="0"/>
+              <a:rPr lang="en-US"/>
               <a:t>Fourth level</a:t>
             </a:r>
           </a:p>
           <a:p>
             <a:pPr lvl="4"/>
             <a:r>
-              <a:rPr lang="en-US" smtClean="0"/>
+              <a:rPr lang="en-US"/>
               <a:t>Fifth level</a:t>
             </a:r>
-            <a:endParaRPr lang="en-US"/>
           </a:p>
         </p:txBody>
       </p:sp>
@@ -1666,7 +1668,7 @@
           <a:p>
             <a:pPr lvl="0"/>
             <a:r>
-              <a:rPr lang="en-US" smtClean="0"/>
+              <a:rPr lang="en-US"/>
               <a:t>Click to edit Master text styles</a:t>
             </a:r>
           </a:p>
@@ -1722,38 +1724,37 @@
           <a:p>
             <a:pPr lvl="0"/>
             <a:r>
-              <a:rPr lang="en-US" smtClean="0"/>
+              <a:rPr lang="en-US"/>
               <a:t>Click to edit Master text styles</a:t>
             </a:r>
           </a:p>
           <a:p>
             <a:pPr lvl="1"/>
             <a:r>
-              <a:rPr lang="en-US" smtClean="0"/>
+              <a:rPr lang="en-US"/>
               <a:t>Second level</a:t>
             </a:r>
           </a:p>
           <a:p>
             <a:pPr lvl="2"/>
             <a:r>
-              <a:rPr lang="en-US" smtClean="0"/>
+              <a:rPr lang="en-US"/>
               <a:t>Third level</a:t>
             </a:r>
           </a:p>
           <a:p>
             <a:pPr lvl="3"/>
             <a:r>
-              <a:rPr lang="en-US" smtClean="0"/>
+              <a:rPr lang="en-US"/>
               <a:t>Fourth level</a:t>
             </a:r>
           </a:p>
           <a:p>
             <a:pPr lvl="4"/>
             <a:r>
-              <a:rPr lang="en-US" smtClean="0"/>
+              <a:rPr lang="en-US"/>
               <a:t>Fifth level</a:t>
             </a:r>
-            <a:endParaRPr lang="en-US"/>
           </a:p>
         </p:txBody>
       </p:sp>
@@ -1774,7 +1775,7 @@
           <a:p>
             <a:fld id="{5BCAD085-E8A6-8845-BD4E-CB4CCA059FC4}" type="datetimeFigureOut">
               <a:rPr lang="en-US" smtClean="0"/>
-              <a:t>1/27/13</a:t>
+              <a:t>11/9/2025</a:t>
             </a:fld>
             <a:endParaRPr lang="en-US"/>
           </a:p>
@@ -1868,10 +1869,9 @@
           <a:lstStyle/>
           <a:p>
             <a:r>
-              <a:rPr lang="en-US" smtClean="0"/>
+              <a:rPr lang="en-US"/>
               <a:t>Click to edit Master title style</a:t>
             </a:r>
-            <a:endParaRPr lang="en-US"/>
           </a:p>
         </p:txBody>
       </p:sp>
@@ -1892,7 +1892,7 @@
           <a:p>
             <a:fld id="{5BCAD085-E8A6-8845-BD4E-CB4CCA059FC4}" type="datetimeFigureOut">
               <a:rPr lang="en-US" smtClean="0"/>
-              <a:t>1/27/13</a:t>
+              <a:t>11/9/2025</a:t>
             </a:fld>
             <a:endParaRPr lang="en-US"/>
           </a:p>
@@ -1987,7 +1987,7 @@
           <a:p>
             <a:fld id="{5BCAD085-E8A6-8845-BD4E-CB4CCA059FC4}" type="datetimeFigureOut">
               <a:rPr lang="en-US" smtClean="0"/>
-              <a:t>1/27/13</a:t>
+              <a:t>11/9/2025</a:t>
             </a:fld>
             <a:endParaRPr lang="en-US"/>
           </a:p>
@@ -2090,10 +2090,9 @@
           </a:lstStyle>
           <a:p>
             <a:r>
-              <a:rPr lang="en-US" smtClean="0"/>
+              <a:rPr lang="en-US"/>
               <a:t>Click to edit Master title style</a:t>
             </a:r>
-            <a:endParaRPr lang="en-US"/>
           </a:p>
         </p:txBody>
       </p:sp>
@@ -2147,38 +2146,37 @@
           <a:p>
             <a:pPr lvl="0"/>
             <a:r>
-              <a:rPr lang="en-US" smtClean="0"/>
+              <a:rPr lang="en-US"/>
               <a:t>Click to edit Master text styles</a:t>
             </a:r>
           </a:p>
           <a:p>
             <a:pPr lvl="1"/>
             <a:r>
-              <a:rPr lang="en-US" smtClean="0"/>
+              <a:rPr lang="en-US"/>
               <a:t>Second level</a:t>
             </a:r>
           </a:p>
           <a:p>
             <a:pPr lvl="2"/>
             <a:r>
-              <a:rPr lang="en-US" smtClean="0"/>
+              <a:rPr lang="en-US"/>
               <a:t>Third level</a:t>
             </a:r>
           </a:p>
           <a:p>
             <a:pPr lvl="3"/>
             <a:r>
-              <a:rPr lang="en-US" smtClean="0"/>
+              <a:rPr lang="en-US"/>
               <a:t>Fourth level</a:t>
             </a:r>
           </a:p>
           <a:p>
             <a:pPr lvl="4"/>
             <a:r>
-              <a:rPr lang="en-US" smtClean="0"/>
+              <a:rPr lang="en-US"/>
               <a:t>Fifth level</a:t>
             </a:r>
-            <a:endParaRPr lang="en-US"/>
           </a:p>
         </p:txBody>
       </p:sp>
@@ -2241,7 +2239,7 @@
           <a:p>
             <a:pPr lvl="0"/>
             <a:r>
-              <a:rPr lang="en-US" smtClean="0"/>
+              <a:rPr lang="en-US"/>
               <a:t>Click to edit Master text styles</a:t>
             </a:r>
           </a:p>
@@ -2264,7 +2262,7 @@
           <a:p>
             <a:fld id="{5BCAD085-E8A6-8845-BD4E-CB4CCA059FC4}" type="datetimeFigureOut">
               <a:rPr lang="en-US" smtClean="0"/>
-              <a:t>1/27/13</a:t>
+              <a:t>11/9/2025</a:t>
             </a:fld>
             <a:endParaRPr lang="en-US"/>
           </a:p>
@@ -2367,10 +2365,9 @@
           </a:lstStyle>
           <a:p>
             <a:r>
-              <a:rPr lang="en-US" smtClean="0"/>
+              <a:rPr lang="en-US"/>
               <a:t>Click to edit Master title style</a:t>
             </a:r>
-            <a:endParaRPr lang="en-US"/>
           </a:p>
         </p:txBody>
       </p:sp>
@@ -2494,7 +2491,7 @@
           <a:p>
             <a:pPr lvl="0"/>
             <a:r>
-              <a:rPr lang="en-US" smtClean="0"/>
+              <a:rPr lang="en-US"/>
               <a:t>Click to edit Master text styles</a:t>
             </a:r>
           </a:p>
@@ -2517,7 +2514,7 @@
           <a:p>
             <a:fld id="{5BCAD085-E8A6-8845-BD4E-CB4CCA059FC4}" type="datetimeFigureOut">
               <a:rPr lang="en-US" smtClean="0"/>
-              <a:t>1/27/13</a:t>
+              <a:t>11/9/2025</a:t>
             </a:fld>
             <a:endParaRPr lang="en-US"/>
           </a:p>
@@ -2626,10 +2623,9 @@
           <a:lstStyle/>
           <a:p>
             <a:r>
-              <a:rPr lang="en-US" smtClean="0"/>
+              <a:rPr lang="en-US"/>
               <a:t>Click to edit Master title style</a:t>
             </a:r>
-            <a:endParaRPr lang="en-US"/>
           </a:p>
         </p:txBody>
       </p:sp>
@@ -2660,38 +2656,37 @@
           <a:p>
             <a:pPr lvl="0"/>
             <a:r>
-              <a:rPr lang="en-US" smtClean="0"/>
+              <a:rPr lang="en-US"/>
               <a:t>Click to edit Master text styles</a:t>
             </a:r>
           </a:p>
           <a:p>
             <a:pPr lvl="1"/>
             <a:r>
-              <a:rPr lang="en-US" smtClean="0"/>
+              <a:rPr lang="en-US"/>
               <a:t>Second level</a:t>
             </a:r>
           </a:p>
           <a:p>
             <a:pPr lvl="2"/>
             <a:r>
-              <a:rPr lang="en-US" smtClean="0"/>
+              <a:rPr lang="en-US"/>
               <a:t>Third level</a:t>
             </a:r>
           </a:p>
           <a:p>
             <a:pPr lvl="3"/>
             <a:r>
-              <a:rPr lang="en-US" smtClean="0"/>
+              <a:rPr lang="en-US"/>
               <a:t>Fourth level</a:t>
             </a:r>
           </a:p>
           <a:p>
             <a:pPr lvl="4"/>
             <a:r>
-              <a:rPr lang="en-US" smtClean="0"/>
+              <a:rPr lang="en-US"/>
               <a:t>Fifth level</a:t>
             </a:r>
-            <a:endParaRPr lang="en-US"/>
           </a:p>
         </p:txBody>
       </p:sp>
@@ -2730,7 +2725,7 @@
           <a:p>
             <a:fld id="{5BCAD085-E8A6-8845-BD4E-CB4CCA059FC4}" type="datetimeFigureOut">
               <a:rPr lang="en-US" smtClean="0"/>
-              <a:t>1/27/13</a:t>
+              <a:t>11/9/2025</a:t>
             </a:fld>
             <a:endParaRPr lang="en-US"/>
           </a:p>
@@ -3089,7 +3084,7 @@
 </file>
 
 <file path=ppt/slides/slide1.xml><?xml version="1.0" encoding="utf-8"?>
-<p:sld xmlns:a="http://schemas.openxmlformats.org/drawingml/2006/main" xmlns:p="http://schemas.openxmlformats.org/presentationml/2006/main" xmlns:r="http://schemas.openxmlformats.org/officeDocument/2006/relationships">
+<p:sld xmlns:a="http://schemas.openxmlformats.org/drawingml/2006/main" xmlns:r="http://schemas.openxmlformats.org/officeDocument/2006/relationships" xmlns:p="http://schemas.openxmlformats.org/presentationml/2006/main">
   <p:cSld>
     <p:bg>
       <p:bgPr>
@@ -3105,7 +3100,14 @@
         <p:cNvGrpSpPr/>
         <p:nvPr/>
       </p:nvGrpSpPr>
-      <p:grpSpPr/>
+      <p:grpSpPr>
+        <a:xfrm>
+          <a:off x="0" y="0"/>
+          <a:ext cx="0" cy="0"/>
+          <a:chOff x="0" y="0"/>
+          <a:chExt cx="0" cy="0"/>
+        </a:xfrm>
+      </p:grpSpPr>
       <p:sp>
         <p:nvSpPr>
           <p:cNvPr id="2" name="Rectangle 1"/>
@@ -3168,8 +3170,8 @@
         </p:nvSpPr>
         <p:spPr>
           <a:xfrm>
-            <a:off x="914400" y="2743200"/>
-            <a:ext cx="12801600" cy="1828800"/>
+            <a:off x="2825829" y="2743200"/>
+            <a:ext cx="8978741" cy="1200329"/>
           </a:xfrm>
           <a:prstGeom prst="rect">
             <a:avLst/>
@@ -3190,13 +3192,57 @@
               </a:defRPr>
             </a:pPr>
             <a:r>
-              <a:t>Recuperá $72.000 al año</a:t>
-            </a:r>
-          </a:p>
-          <a:p>
-            <a:r>
-              <a:t>en horas médicas perdidas</a:t>
-            </a:r>
+              <a:rPr dirty="0" err="1"/>
+              <a:t>Recuperá</a:t>
+            </a:r>
+            <a:r>
+              <a:rPr dirty="0"/>
+              <a:t> </a:t>
+            </a:r>
+            <a:r>
+              <a:rPr lang="es-ES" dirty="0"/>
+              <a:t>hasta </a:t>
+            </a:r>
+            <a:r>
+              <a:rPr dirty="0"/>
+              <a:t>$7</a:t>
+            </a:r>
+            <a:r>
+              <a:rPr lang="es-ES" dirty="0"/>
+              <a:t>0</a:t>
+            </a:r>
+            <a:r>
+              <a:rPr dirty="0"/>
+              <a:t>.000 al </a:t>
+            </a:r>
+            <a:r>
+              <a:rPr dirty="0" err="1"/>
+              <a:t>año</a:t>
+            </a:r>
+            <a:endParaRPr dirty="0"/>
+          </a:p>
+          <a:p>
+            <a:r>
+              <a:rPr dirty="0" err="1"/>
+              <a:t>en</a:t>
+            </a:r>
+            <a:r>
+              <a:rPr dirty="0"/>
+              <a:t> horas </a:t>
+            </a:r>
+            <a:r>
+              <a:rPr dirty="0" err="1"/>
+              <a:t>médicas</a:t>
+            </a:r>
+            <a:r>
+              <a:rPr dirty="0"/>
+              <a:t> </a:t>
+            </a:r>
+            <a:r>
+              <a:rPr dirty="0" err="1"/>
+              <a:t>perdidas</a:t>
+            </a:r>
+            <a:endParaRPr dirty="0"/>
           </a:p>
         </p:txBody>
       </p:sp>
@@ -3280,7 +3326,32 @@
               </a:defRPr>
             </a:pPr>
             <a:r>
-              <a:t>De 33% a 9% de ausentismo en 90 días</a:t>
+              <a:rPr dirty="0"/>
+              <a:t>De 33% a </a:t>
+            </a:r>
+            <a:r>
+              <a:rPr lang="es-ES" dirty="0"/>
+              <a:t>menos del 10</a:t>
+            </a:r>
+            <a:r>
+              <a:rPr dirty="0"/>
+              <a:t>% de </a:t>
+            </a:r>
+            <a:r>
+              <a:rPr dirty="0" err="1"/>
+              <a:t>ausentismo</a:t>
+            </a:r>
+            <a:r>
+              <a:rPr dirty="0"/>
+              <a:t> </a:t>
+            </a:r>
+            <a:r>
+              <a:rPr dirty="0" err="1"/>
+              <a:t>en</a:t>
+            </a:r>
+            <a:r>
+              <a:rPr dirty="0"/>
+              <a:t> 90 días</a:t>
             </a:r>
           </a:p>
         </p:txBody>
@@ -3294,7 +3365,7 @@
 </file>
 
 <file path=ppt/slides/slide10.xml><?xml version="1.0" encoding="utf-8"?>
-<p:sld xmlns:a="http://schemas.openxmlformats.org/drawingml/2006/main" xmlns:p="http://schemas.openxmlformats.org/presentationml/2006/main" xmlns:r="http://schemas.openxmlformats.org/officeDocument/2006/relationships">
+<p:sld xmlns:a="http://schemas.openxmlformats.org/drawingml/2006/main" xmlns:r="http://schemas.openxmlformats.org/officeDocument/2006/relationships" xmlns:p="http://schemas.openxmlformats.org/presentationml/2006/main">
   <p:cSld>
     <p:spTree>
       <p:nvGrpSpPr>
@@ -3302,7 +3373,14 @@
         <p:cNvGrpSpPr/>
         <p:nvPr/>
       </p:nvGrpSpPr>
-      <p:grpSpPr/>
+      <p:grpSpPr>
+        <a:xfrm>
+          <a:off x="0" y="0"/>
+          <a:ext cx="0" cy="0"/>
+          <a:chOff x="0" y="0"/>
+          <a:chExt cx="0" cy="0"/>
+        </a:xfrm>
+      </p:grpSpPr>
       <p:sp>
         <p:nvSpPr>
           <p:cNvPr id="2" name="TextBox 1"/>
@@ -3722,6 +3800,7 @@
           <a:lstStyle/>
           <a:p>
             <a:pPr algn="ctr"/>
+            <a:endParaRPr/>
           </a:p>
         </p:txBody>
       </p:sp>
@@ -3864,6 +3943,7 @@
           <a:lstStyle/>
           <a:p>
             <a:pPr algn="ctr"/>
+            <a:endParaRPr/>
           </a:p>
         </p:txBody>
       </p:sp>
@@ -4006,6 +4086,7 @@
           <a:lstStyle/>
           <a:p>
             <a:pPr algn="ctr"/>
+            <a:endParaRPr/>
           </a:p>
         </p:txBody>
       </p:sp>
@@ -4119,7 +4200,7 @@
 </file>
 
 <file path=ppt/slides/slide11.xml><?xml version="1.0" encoding="utf-8"?>
-<p:sld xmlns:a="http://schemas.openxmlformats.org/drawingml/2006/main" xmlns:p="http://schemas.openxmlformats.org/presentationml/2006/main" xmlns:r="http://schemas.openxmlformats.org/officeDocument/2006/relationships">
+<p:sld xmlns:a="http://schemas.openxmlformats.org/drawingml/2006/main" xmlns:r="http://schemas.openxmlformats.org/officeDocument/2006/relationships" xmlns:p="http://schemas.openxmlformats.org/presentationml/2006/main">
   <p:cSld>
     <p:spTree>
       <p:nvGrpSpPr>
@@ -4127,7 +4208,14 @@
         <p:cNvGrpSpPr/>
         <p:nvPr/>
       </p:nvGrpSpPr>
-      <p:grpSpPr/>
+      <p:grpSpPr>
+        <a:xfrm>
+          <a:off x="0" y="0"/>
+          <a:ext cx="0" cy="0"/>
+          <a:chOff x="0" y="0"/>
+          <a:chExt cx="0" cy="0"/>
+        </a:xfrm>
+      </p:grpSpPr>
       <p:sp>
         <p:nvSpPr>
           <p:cNvPr id="2" name="TextBox 1"/>
@@ -4756,7 +4844,7 @@
 </file>
 
 <file path=ppt/slides/slide2.xml><?xml version="1.0" encoding="utf-8"?>
-<p:sld xmlns:a="http://schemas.openxmlformats.org/drawingml/2006/main" xmlns:p="http://schemas.openxmlformats.org/presentationml/2006/main" xmlns:r="http://schemas.openxmlformats.org/officeDocument/2006/relationships">
+<p:sld xmlns:a="http://schemas.openxmlformats.org/drawingml/2006/main" xmlns:r="http://schemas.openxmlformats.org/officeDocument/2006/relationships" xmlns:p="http://schemas.openxmlformats.org/presentationml/2006/main">
   <p:cSld>
     <p:spTree>
       <p:nvGrpSpPr>
@@ -4764,7 +4852,14 @@
         <p:cNvGrpSpPr/>
         <p:nvPr/>
       </p:nvGrpSpPr>
-      <p:grpSpPr/>
+      <p:grpSpPr>
+        <a:xfrm>
+          <a:off x="0" y="0"/>
+          <a:ext cx="0" cy="0"/>
+          <a:chOff x="0" y="0"/>
+          <a:chExt cx="0" cy="0"/>
+        </a:xfrm>
+      </p:grpSpPr>
       <p:sp>
         <p:nvSpPr>
           <p:cNvPr id="2" name="TextBox 1"/>
@@ -4774,7 +4869,7 @@
         <p:spPr>
           <a:xfrm>
             <a:off x="457200" y="457200"/>
-            <a:ext cx="13716000" cy="914400"/>
+            <a:ext cx="11753539" cy="769441"/>
           </a:xfrm>
           <a:prstGeom prst="rect">
             <a:avLst/>
@@ -4795,8 +4890,18 @@
               </a:defRPr>
             </a:pPr>
             <a:r>
-              <a:t>El problema de los $72.000</a:t>
-            </a:r>
+              <a:rPr dirty="0"/>
+              <a:t>El </a:t>
+            </a:r>
+            <a:r>
+              <a:rPr dirty="0" err="1"/>
+              <a:t>problema</a:t>
+            </a:r>
+            <a:r>
+              <a:rPr lang="es-ES" dirty="0"/>
+              <a:t>: Decenas de miles perdidos cada año</a:t>
+            </a:r>
+            <a:endParaRPr dirty="0"/>
           </a:p>
         </p:txBody>
       </p:sp>
@@ -4899,7 +5004,16 @@
               </a:defRPr>
             </a:pPr>
             <a:r>
-              <a:t>$72K</a:t>
+              <a:rPr dirty="0"/>
+              <a:t>$</a:t>
+            </a:r>
+            <a:r>
+              <a:rPr lang="es-ES" dirty="0"/>
+              <a:t>50-100</a:t>
+            </a:r>
+            <a:r>
+              <a:rPr dirty="0"/>
+              <a:t>K</a:t>
             </a:r>
           </a:p>
           <a:p>
@@ -4914,11 +5028,31 @@
               </a:defRPr>
             </a:pPr>
             <a:r>
-              <a:t>Pérdida anual</a:t>
-            </a:r>
-            <a:br/>
-            <a:r>
-              <a:t>(clínica mediana)</a:t>
+              <a:rPr dirty="0" err="1"/>
+              <a:t>Pérdida</a:t>
+            </a:r>
+            <a:r>
+              <a:rPr dirty="0"/>
+              <a:t> </a:t>
+            </a:r>
+            <a:r>
+              <a:rPr dirty="0" err="1"/>
+              <a:t>anual</a:t>
+            </a:r>
+            <a:br>
+              <a:rPr dirty="0"/>
+            </a:br>
+            <a:r>
+              <a:rPr dirty="0"/>
+              <a:t>(</a:t>
+            </a:r>
+            <a:r>
+              <a:rPr lang="es-ES" dirty="0"/>
+              <a:t>según tamaño</a:t>
+            </a:r>
+            <a:r>
+              <a:rPr dirty="0"/>
+              <a:t>)</a:t>
             </a:r>
           </a:p>
         </p:txBody>
@@ -4968,8 +5102,10 @@
               </a:defRPr>
             </a:pPr>
             <a:r>
-              <a:t>156h</a:t>
-            </a:r>
+              <a:rPr lang="en-US" dirty="0"/>
+              <a:t>~200h</a:t>
+            </a:r>
+            <a:endParaRPr dirty="0"/>
           </a:p>
           <a:p>
             <a:pPr algn="ctr">
@@ -4983,12 +5119,29 @@
               </a:defRPr>
             </a:pPr>
             <a:r>
-              <a:t>Horas médicas</a:t>
-            </a:r>
-            <a:br/>
-            <a:r>
-              <a:t>desperdiciadas/mes</a:t>
-            </a:r>
+              <a:rPr dirty="0"/>
+              <a:t>Horas </a:t>
+            </a:r>
+            <a:r>
+              <a:rPr dirty="0" err="1"/>
+              <a:t>médicas</a:t>
+            </a:r>
+            <a:br>
+              <a:rPr dirty="0"/>
+            </a:br>
+            <a:r>
+              <a:rPr dirty="0" err="1"/>
+              <a:t>desperdiciadas</a:t>
+            </a:r>
+            <a:r>
+              <a:rPr dirty="0"/>
+              <a:t>/</a:t>
+            </a:r>
+            <a:r>
+              <a:rPr dirty="0" err="1"/>
+              <a:t>mes</a:t>
+            </a:r>
+            <a:endParaRPr dirty="0"/>
           </a:p>
         </p:txBody>
       </p:sp>
@@ -5174,7 +5327,7 @@
 </file>
 
 <file path=ppt/slides/slide3.xml><?xml version="1.0" encoding="utf-8"?>
-<p:sld xmlns:a="http://schemas.openxmlformats.org/drawingml/2006/main" xmlns:p="http://schemas.openxmlformats.org/presentationml/2006/main" xmlns:r="http://schemas.openxmlformats.org/officeDocument/2006/relationships">
+<p:sld xmlns:a="http://schemas.openxmlformats.org/drawingml/2006/main" xmlns:r="http://schemas.openxmlformats.org/officeDocument/2006/relationships" xmlns:p="http://schemas.openxmlformats.org/presentationml/2006/main">
   <p:cSld>
     <p:spTree>
       <p:nvGrpSpPr>
@@ -5182,7 +5335,14 @@
         <p:cNvGrpSpPr/>
         <p:nvPr/>
       </p:nvGrpSpPr>
-      <p:grpSpPr/>
+      <p:grpSpPr>
+        <a:xfrm>
+          <a:off x="0" y="0"/>
+          <a:ext cx="0" cy="0"/>
+          <a:chOff x="0" y="0"/>
+          <a:chExt cx="0" cy="0"/>
+        </a:xfrm>
+      </p:grpSpPr>
       <p:sp>
         <p:nvSpPr>
           <p:cNvPr id="2" name="TextBox 1"/>
@@ -5503,7 +5663,7 @@
 </file>
 
 <file path=ppt/slides/slide4.xml><?xml version="1.0" encoding="utf-8"?>
-<p:sld xmlns:a="http://schemas.openxmlformats.org/drawingml/2006/main" xmlns:p="http://schemas.openxmlformats.org/presentationml/2006/main" xmlns:r="http://schemas.openxmlformats.org/officeDocument/2006/relationships">
+<p:sld xmlns:a="http://schemas.openxmlformats.org/drawingml/2006/main" xmlns:r="http://schemas.openxmlformats.org/officeDocument/2006/relationships" xmlns:p="http://schemas.openxmlformats.org/presentationml/2006/main">
   <p:cSld>
     <p:spTree>
       <p:nvGrpSpPr>
@@ -5511,7 +5671,14 @@
         <p:cNvGrpSpPr/>
         <p:nvPr/>
       </p:nvGrpSpPr>
-      <p:grpSpPr/>
+      <p:grpSpPr>
+        <a:xfrm>
+          <a:off x="0" y="0"/>
+          <a:ext cx="0" cy="0"/>
+          <a:chOff x="0" y="0"/>
+          <a:chExt cx="0" cy="0"/>
+        </a:xfrm>
+      </p:grpSpPr>
       <p:sp>
         <p:nvSpPr>
           <p:cNvPr id="2" name="TextBox 1"/>
@@ -5589,6 +5756,7 @@
           <a:lstStyle/>
           <a:p>
             <a:pPr algn="ctr"/>
+            <a:endParaRPr/>
           </a:p>
         </p:txBody>
       </p:sp>
@@ -5735,6 +5903,7 @@
           <a:lstStyle/>
           <a:p>
             <a:pPr algn="ctr"/>
+            <a:endParaRPr/>
           </a:p>
         </p:txBody>
       </p:sp>
@@ -5881,6 +6050,7 @@
           <a:lstStyle/>
           <a:p>
             <a:pPr algn="ctr"/>
+            <a:endParaRPr/>
           </a:p>
         </p:txBody>
       </p:sp>
@@ -6063,7 +6233,7 @@
 </file>
 
 <file path=ppt/slides/slide5.xml><?xml version="1.0" encoding="utf-8"?>
-<p:sld xmlns:a="http://schemas.openxmlformats.org/drawingml/2006/main" xmlns:p="http://schemas.openxmlformats.org/presentationml/2006/main" xmlns:r="http://schemas.openxmlformats.org/officeDocument/2006/relationships">
+<p:sld xmlns:a="http://schemas.openxmlformats.org/drawingml/2006/main" xmlns:r="http://schemas.openxmlformats.org/officeDocument/2006/relationships" xmlns:p="http://schemas.openxmlformats.org/presentationml/2006/main">
   <p:cSld>
     <p:spTree>
       <p:nvGrpSpPr>
@@ -6071,7 +6241,14 @@
         <p:cNvGrpSpPr/>
         <p:nvPr/>
       </p:nvGrpSpPr>
-      <p:grpSpPr/>
+      <p:grpSpPr>
+        <a:xfrm>
+          <a:off x="0" y="0"/>
+          <a:ext cx="0" cy="0"/>
+          <a:chOff x="0" y="0"/>
+          <a:chExt cx="0" cy="0"/>
+        </a:xfrm>
+      </p:grpSpPr>
       <p:sp>
         <p:nvSpPr>
           <p:cNvPr id="2" name="TextBox 1"/>
@@ -6145,6 +6322,7 @@
           <a:lstStyle/>
           <a:p>
             <a:pPr algn="ctr"/>
+            <a:endParaRPr/>
           </a:p>
         </p:txBody>
       </p:sp>
@@ -6287,6 +6465,7 @@
           <a:lstStyle/>
           <a:p>
             <a:pPr algn="ctr"/>
+            <a:endParaRPr/>
           </a:p>
         </p:txBody>
       </p:sp>
@@ -6429,6 +6608,7 @@
           <a:lstStyle/>
           <a:p>
             <a:pPr algn="ctr"/>
+            <a:endParaRPr/>
           </a:p>
         </p:txBody>
       </p:sp>
@@ -6571,6 +6751,7 @@
           <a:lstStyle/>
           <a:p>
             <a:pPr algn="ctr"/>
+            <a:endParaRPr/>
           </a:p>
         </p:txBody>
       </p:sp>
@@ -6649,7 +6830,7 @@
         <p:spPr>
           <a:xfrm>
             <a:off x="2103120" y="6263640"/>
-            <a:ext cx="10972800" cy="365760"/>
+            <a:ext cx="9271641" cy="338554"/>
           </a:xfrm>
           <a:prstGeom prst="rect">
             <a:avLst/>
@@ -6670,8 +6851,14 @@
               </a:defRPr>
             </a:pPr>
             <a:r>
-              <a:t>Paciente fiel 5+ años = 377x más valioso</a:t>
-            </a:r>
+              <a:rPr lang="es-ES" dirty="0"/>
+              <a:t>Retener cuesta 5-7x menos que adquirir nuevo paciente | Pacientes recurrentes generan mayor valor </a:t>
+            </a:r>
+            <a:r>
+              <a:rPr lang="es-ES" dirty="0" err="1"/>
+              <a:t>lifetime</a:t>
+            </a:r>
+            <a:endParaRPr dirty="0"/>
           </a:p>
         </p:txBody>
       </p:sp>
@@ -6684,7 +6871,7 @@
 </file>
 
 <file path=ppt/slides/slide6.xml><?xml version="1.0" encoding="utf-8"?>
-<p:sld xmlns:a="http://schemas.openxmlformats.org/drawingml/2006/main" xmlns:p="http://schemas.openxmlformats.org/presentationml/2006/main" xmlns:r="http://schemas.openxmlformats.org/officeDocument/2006/relationships">
+<p:sld xmlns:a="http://schemas.openxmlformats.org/drawingml/2006/main" xmlns:r="http://schemas.openxmlformats.org/officeDocument/2006/relationships" xmlns:p="http://schemas.openxmlformats.org/presentationml/2006/main">
   <p:cSld>
     <p:spTree>
       <p:nvGrpSpPr>
@@ -6692,7 +6879,14 @@
         <p:cNvGrpSpPr/>
         <p:nvPr/>
       </p:nvGrpSpPr>
-      <p:grpSpPr/>
+      <p:grpSpPr>
+        <a:xfrm>
+          <a:off x="0" y="0"/>
+          <a:ext cx="0" cy="0"/>
+          <a:chOff x="0" y="0"/>
+          <a:chExt cx="0" cy="0"/>
+        </a:xfrm>
+      </p:grpSpPr>
       <p:sp>
         <p:nvSpPr>
           <p:cNvPr id="2" name="TextBox 1"/>
@@ -6770,6 +6964,7 @@
           <a:lstStyle/>
           <a:p>
             <a:pPr algn="ctr"/>
+            <a:endParaRPr/>
           </a:p>
         </p:txBody>
       </p:sp>
@@ -7003,6 +7198,7 @@
           <a:lstStyle/>
           <a:p>
             <a:pPr algn="ctr"/>
+            <a:endParaRPr/>
           </a:p>
         </p:txBody>
       </p:sp>
@@ -7251,6 +7447,7 @@
           <a:lstStyle/>
           <a:p>
             <a:pPr algn="ctr"/>
+            <a:endParaRPr/>
           </a:p>
         </p:txBody>
       </p:sp>
@@ -7491,8 +7688,34 @@
               </a:defRPr>
             </a:pPr>
             <a:r>
-              <a:t>Ejemplo: Clínica 500 pacientes/mes</a:t>
-            </a:r>
+              <a:rPr dirty="0" err="1"/>
+              <a:t>Ejemplo</a:t>
+            </a:r>
+            <a:r>
+              <a:rPr dirty="0"/>
+              <a:t>: </a:t>
+            </a:r>
+            <a:r>
+              <a:rPr dirty="0" err="1"/>
+              <a:t>Clínica</a:t>
+            </a:r>
+            <a:r>
+              <a:rPr dirty="0"/>
+              <a:t> 500 </a:t>
+            </a:r>
+            <a:r>
+              <a:rPr dirty="0" err="1"/>
+              <a:t>pacientes</a:t>
+            </a:r>
+            <a:r>
+              <a:rPr dirty="0"/>
+              <a:t>/</a:t>
+            </a:r>
+            <a:r>
+              <a:rPr dirty="0" err="1"/>
+              <a:t>mes</a:t>
+            </a:r>
+            <a:endParaRPr dirty="0"/>
           </a:p>
           <a:p>
             <a:pPr algn="ctr">
@@ -7506,8 +7729,14 @@
               </a:defRPr>
             </a:pPr>
             <a:r>
-              <a:t>Pro tier: $375 MRR | $4,500/año</a:t>
-            </a:r>
+              <a:rPr dirty="0"/>
+              <a:t>Pro tier: $375 MRR | $4,500/</a:t>
+            </a:r>
+            <a:r>
+              <a:rPr dirty="0" err="1"/>
+              <a:t>año</a:t>
+            </a:r>
+            <a:endParaRPr dirty="0"/>
           </a:p>
           <a:p>
             <a:pPr algn="ctr">
@@ -7521,7 +7750,56 @@
               </a:defRPr>
             </a:pPr>
             <a:r>
-              <a:t>ROI: Recupera $72K, invierte $4.5K = 1,500% ROI</a:t>
+              <a:rPr dirty="0"/>
+              <a:t>ROI: </a:t>
+            </a:r>
+            <a:r>
+              <a:rPr dirty="0" err="1"/>
+              <a:t>Recupera</a:t>
+            </a:r>
+            <a:r>
+              <a:rPr dirty="0"/>
+              <a:t> $</a:t>
+            </a:r>
+            <a:r>
+              <a:rPr lang="es-ES" dirty="0"/>
+              <a:t>30</a:t>
+            </a:r>
+            <a:r>
+              <a:rPr dirty="0"/>
+              <a:t>K</a:t>
+            </a:r>
+            <a:r>
+              <a:rPr lang="es-ES" dirty="0"/>
+              <a:t>-80K</a:t>
+            </a:r>
+            <a:r>
+              <a:rPr dirty="0"/>
+              <a:t>, </a:t>
+            </a:r>
+            <a:r>
+              <a:rPr dirty="0" err="1"/>
+              <a:t>invierte</a:t>
+            </a:r>
+            <a:r>
+              <a:rPr dirty="0"/>
+              <a:t> $4.5K = </a:t>
+            </a:r>
+            <a:r>
+              <a:rPr lang="es-ES" dirty="0"/>
+              <a:t>560%-</a:t>
+            </a:r>
+            <a:r>
+              <a:rPr dirty="0"/>
+              <a:t>1,</a:t>
+            </a:r>
+            <a:r>
+              <a:rPr lang="es-ES" dirty="0"/>
+              <a:t>68</a:t>
+            </a:r>
+            <a:r>
+              <a:rPr dirty="0"/>
+              <a:t>0% ROI</a:t>
             </a:r>
           </a:p>
         </p:txBody>
@@ -7535,7 +7813,7 @@
 </file>
 
 <file path=ppt/slides/slide7.xml><?xml version="1.0" encoding="utf-8"?>
-<p:sld xmlns:a="http://schemas.openxmlformats.org/drawingml/2006/main" xmlns:p="http://schemas.openxmlformats.org/presentationml/2006/main" xmlns:r="http://schemas.openxmlformats.org/officeDocument/2006/relationships">
+<p:sld xmlns:a="http://schemas.openxmlformats.org/drawingml/2006/main" xmlns:r="http://schemas.openxmlformats.org/officeDocument/2006/relationships" xmlns:p="http://schemas.openxmlformats.org/presentationml/2006/main">
   <p:cSld>
     <p:spTree>
       <p:nvGrpSpPr>
@@ -7543,7 +7821,14 @@
         <p:cNvGrpSpPr/>
         <p:nvPr/>
       </p:nvGrpSpPr>
-      <p:grpSpPr/>
+      <p:grpSpPr>
+        <a:xfrm>
+          <a:off x="0" y="0"/>
+          <a:ext cx="0" cy="0"/>
+          <a:chOff x="0" y="0"/>
+          <a:chExt cx="0" cy="0"/>
+        </a:xfrm>
+      </p:grpSpPr>
       <p:sp>
         <p:nvSpPr>
           <p:cNvPr id="2" name="TextBox 1"/>
@@ -7622,8 +7907,8 @@
         </p:nvSpPr>
         <p:spPr>
           <a:xfrm>
-            <a:off x="10515600" y="2011680"/>
-            <a:ext cx="3200400" cy="320040"/>
+            <a:off x="12861278" y="2011680"/>
+            <a:ext cx="854722" cy="369332"/>
           </a:xfrm>
           <a:prstGeom prst="rect">
             <a:avLst/>
@@ -7644,7 +7929,16 @@
               </a:defRPr>
             </a:pPr>
             <a:r>
-              <a:t>$180M</a:t>
+              <a:rPr dirty="0"/>
+              <a:t>$</a:t>
+            </a:r>
+            <a:r>
+              <a:rPr lang="es-ES" dirty="0"/>
+              <a:t>156</a:t>
+            </a:r>
+            <a:r>
+              <a:rPr dirty="0"/>
+              <a:t>M</a:t>
             </a:r>
           </a:p>
         </p:txBody>
@@ -7683,7 +7977,7 @@
           </a:fontRef>
         </p:style>
         <p:txBody>
-          <a:bodyPr rtlCol="0" anchor="ctr" lIns="182880"/>
+          <a:bodyPr lIns="182880" rtlCol="0" anchor="ctr"/>
           <a:lstStyle/>
           <a:p>
             <a:pPr>
@@ -7694,8 +7988,18 @@
               </a:defRPr>
             </a:pPr>
             <a:r>
-              <a:t>360K camas hospitalarias × $500/cama/año</a:t>
-            </a:r>
+              <a:rPr lang="es-ES" dirty="0"/>
+              <a:t>13M </a:t>
+            </a:r>
+            <a:r>
+              <a:rPr lang="es-ES" dirty="0" err="1"/>
+              <a:t>teleconsultas</a:t>
+            </a:r>
+            <a:r>
+              <a:rPr lang="es-ES" dirty="0"/>
+              <a:t> x $1 x 12</a:t>
+            </a:r>
+            <a:endParaRPr dirty="0"/>
           </a:p>
         </p:txBody>
       </p:sp>
@@ -7742,8 +8046,8 @@
         </p:nvSpPr>
         <p:spPr>
           <a:xfrm>
-            <a:off x="10515600" y="3017520"/>
-            <a:ext cx="3200400" cy="320040"/>
+            <a:off x="12800364" y="3017520"/>
+            <a:ext cx="915636" cy="369332"/>
           </a:xfrm>
           <a:prstGeom prst="rect">
             <a:avLst/>
@@ -7764,7 +8068,16 @@
               </a:defRPr>
             </a:pPr>
             <a:r>
-              <a:t>$18M</a:t>
+              <a:rPr dirty="0"/>
+              <a:t>$</a:t>
+            </a:r>
+            <a:r>
+              <a:rPr lang="es-ES" dirty="0"/>
+              <a:t>15.6</a:t>
+            </a:r>
+            <a:r>
+              <a:rPr dirty="0"/>
+              <a:t>M</a:t>
             </a:r>
           </a:p>
         </p:txBody>
@@ -7803,7 +8116,7 @@
           </a:fontRef>
         </p:style>
         <p:txBody>
-          <a:bodyPr rtlCol="0" anchor="ctr" lIns="182880"/>
+          <a:bodyPr lIns="182880" rtlCol="0" anchor="ctr"/>
           <a:lstStyle/>
           <a:p>
             <a:pPr>
@@ -7814,8 +8127,10 @@
               </a:defRPr>
             </a:pPr>
             <a:r>
-              <a:t>10% adopción telemedicina (36K camas)</a:t>
-            </a:r>
+              <a:rPr lang="es-ES" dirty="0"/>
+              <a:t>1% ya son telemedicina HOY</a:t>
+            </a:r>
+            <a:endParaRPr dirty="0"/>
           </a:p>
         </p:txBody>
       </p:sp>
@@ -7828,7 +8143,7 @@
         <p:spPr>
           <a:xfrm>
             <a:off x="914400" y="4023360"/>
-            <a:ext cx="9144000" cy="320040"/>
+            <a:ext cx="1714637" cy="338554"/>
           </a:xfrm>
           <a:prstGeom prst="rect">
             <a:avLst/>
@@ -7849,7 +8164,16 @@
               </a:defRPr>
             </a:pPr>
             <a:r>
-              <a:t>SOM Año 1 (0.5% share)</a:t>
+              <a:rPr dirty="0"/>
+              <a:t>Año 1 (0.5% </a:t>
+            </a:r>
+            <a:r>
+              <a:rPr lang="es-ES" dirty="0"/>
+              <a:t>SAM</a:t>
+            </a:r>
+            <a:r>
+              <a:rPr dirty="0"/>
+              <a:t>)</a:t>
             </a:r>
           </a:p>
         </p:txBody>
@@ -7862,8 +8186,8 @@
         </p:nvSpPr>
         <p:spPr>
           <a:xfrm>
-            <a:off x="10515600" y="4023360"/>
-            <a:ext cx="3200400" cy="320040"/>
+            <a:off x="13053639" y="4023360"/>
+            <a:ext cx="662361" cy="369332"/>
           </a:xfrm>
           <a:prstGeom prst="rect">
             <a:avLst/>
@@ -7884,7 +8208,16 @@
               </a:defRPr>
             </a:pPr>
             <a:r>
-              <a:t>$90K</a:t>
+              <a:rPr dirty="0"/>
+              <a:t>$</a:t>
+            </a:r>
+            <a:r>
+              <a:rPr lang="es-ES" dirty="0"/>
+              <a:t>78</a:t>
+            </a:r>
+            <a:r>
+              <a:rPr dirty="0"/>
+              <a:t>K</a:t>
             </a:r>
           </a:p>
         </p:txBody>
@@ -7923,7 +8256,7 @@
           </a:fontRef>
         </p:style>
         <p:txBody>
-          <a:bodyPr rtlCol="0" anchor="ctr" lIns="182880"/>
+          <a:bodyPr lIns="182880" rtlCol="0" anchor="ctr"/>
           <a:lstStyle/>
           <a:p>
             <a:pPr>
@@ -7934,8 +8267,14 @@
               </a:defRPr>
             </a:pPr>
             <a:r>
-              <a:t>Beachhead market</a:t>
-            </a:r>
+              <a:rPr lang="en-US" dirty="0"/>
+              <a:t>~</a:t>
+            </a:r>
+            <a:r>
+              <a:rPr lang="es-ES" dirty="0"/>
+              <a:t>130 clientes</a:t>
+            </a:r>
+            <a:endParaRPr dirty="0"/>
           </a:p>
         </p:txBody>
       </p:sp>
@@ -7948,7 +8287,7 @@
         <p:spPr>
           <a:xfrm>
             <a:off x="914400" y="5029200"/>
-            <a:ext cx="9144000" cy="320040"/>
+            <a:ext cx="1555939" cy="338554"/>
           </a:xfrm>
           <a:prstGeom prst="rect">
             <a:avLst/>
@@ -7969,7 +8308,24 @@
               </a:defRPr>
             </a:pPr>
             <a:r>
-              <a:t>SOM Año 2 (1.5% share)</a:t>
+              <a:rPr dirty="0"/>
+              <a:t>Año 2 (</a:t>
+            </a:r>
+            <a:r>
+              <a:rPr lang="es-ES" dirty="0"/>
+              <a:t>2</a:t>
+            </a:r>
+            <a:r>
+              <a:rPr dirty="0"/>
+              <a:t>% </a:t>
+            </a:r>
+            <a:r>
+              <a:rPr lang="es-ES" dirty="0"/>
+              <a:t>SAM</a:t>
+            </a:r>
+            <a:r>
+              <a:rPr dirty="0"/>
+              <a:t>)</a:t>
             </a:r>
           </a:p>
         </p:txBody>
@@ -7982,8 +8338,8 @@
         </p:nvSpPr>
         <p:spPr>
           <a:xfrm>
-            <a:off x="10515600" y="5029200"/>
-            <a:ext cx="3200400" cy="320040"/>
+            <a:off x="12936619" y="5029200"/>
+            <a:ext cx="779381" cy="369332"/>
           </a:xfrm>
           <a:prstGeom prst="rect">
             <a:avLst/>
@@ -8004,7 +8360,16 @@
               </a:defRPr>
             </a:pPr>
             <a:r>
-              <a:t>$270K</a:t>
+              <a:rPr dirty="0"/>
+              <a:t>$</a:t>
+            </a:r>
+            <a:r>
+              <a:rPr lang="es-ES" dirty="0"/>
+              <a:t>312</a:t>
+            </a:r>
+            <a:r>
+              <a:rPr dirty="0"/>
+              <a:t>K</a:t>
             </a:r>
           </a:p>
         </p:txBody>
@@ -8043,7 +8408,7 @@
           </a:fontRef>
         </p:style>
         <p:txBody>
-          <a:bodyPr rtlCol="0" anchor="ctr" lIns="182880"/>
+          <a:bodyPr lIns="182880" rtlCol="0" anchor="ctr"/>
           <a:lstStyle/>
           <a:p>
             <a:pPr>
@@ -8054,8 +8419,10 @@
               </a:defRPr>
             </a:pPr>
             <a:r>
-              <a:t>Growth phase</a:t>
-            </a:r>
+              <a:rPr lang="es-ES" dirty="0" err="1"/>
+              <a:t>Partnerships</a:t>
+            </a:r>
+            <a:endParaRPr dirty="0"/>
           </a:p>
         </p:txBody>
       </p:sp>
@@ -8068,7 +8435,7 @@
         <p:spPr>
           <a:xfrm>
             <a:off x="914400" y="6035040"/>
-            <a:ext cx="9144000" cy="320040"/>
+            <a:ext cx="1555939" cy="338554"/>
           </a:xfrm>
           <a:prstGeom prst="rect">
             <a:avLst/>
@@ -8089,7 +8456,24 @@
               </a:defRPr>
             </a:pPr>
             <a:r>
-              <a:t>SOM Año 3 (4.0% share)</a:t>
+              <a:rPr dirty="0"/>
+              <a:t>Año 3 (</a:t>
+            </a:r>
+            <a:r>
+              <a:rPr lang="es-ES" dirty="0"/>
+              <a:t>6</a:t>
+            </a:r>
+            <a:r>
+              <a:rPr dirty="0"/>
+              <a:t>% </a:t>
+            </a:r>
+            <a:r>
+              <a:rPr lang="es-ES" dirty="0"/>
+              <a:t>SAM</a:t>
+            </a:r>
+            <a:r>
+              <a:rPr dirty="0"/>
+              <a:t>)</a:t>
             </a:r>
           </a:p>
         </p:txBody>
@@ -8102,8 +8486,8 @@
         </p:nvSpPr>
         <p:spPr>
           <a:xfrm>
-            <a:off x="10515600" y="6035040"/>
-            <a:ext cx="3200400" cy="320040"/>
+            <a:off x="12936619" y="6035040"/>
+            <a:ext cx="779381" cy="369332"/>
           </a:xfrm>
           <a:prstGeom prst="rect">
             <a:avLst/>
@@ -8124,7 +8508,16 @@
               </a:defRPr>
             </a:pPr>
             <a:r>
-              <a:t>$720K</a:t>
+              <a:rPr dirty="0"/>
+              <a:t>$</a:t>
+            </a:r>
+            <a:r>
+              <a:rPr lang="es-ES" dirty="0"/>
+              <a:t>932</a:t>
+            </a:r>
+            <a:r>
+              <a:rPr dirty="0"/>
+              <a:t>K</a:t>
             </a:r>
           </a:p>
         </p:txBody>
@@ -8163,7 +8556,7 @@
           </a:fontRef>
         </p:style>
         <p:txBody>
-          <a:bodyPr rtlCol="0" anchor="ctr" lIns="182880"/>
+          <a:bodyPr lIns="182880" rtlCol="0" anchor="ctr"/>
           <a:lstStyle/>
           <a:p>
             <a:pPr>
@@ -8174,8 +8567,14 @@
               </a:defRPr>
             </a:pPr>
             <a:r>
-              <a:t>Scale phase</a:t>
-            </a:r>
+              <a:rPr lang="es-ES" dirty="0"/>
+              <a:t>Break-</a:t>
+            </a:r>
+            <a:r>
+              <a:rPr lang="es-ES" dirty="0" err="1"/>
+              <a:t>even</a:t>
+            </a:r>
+            <a:endParaRPr dirty="0"/>
           </a:p>
         </p:txBody>
       </p:sp>
@@ -8228,7 +8627,40 @@
               </a:defRPr>
             </a:pPr>
             <a:r>
-              <a:t>🌎 Expansión Año 4-5: 🇧🇷 Brasil ($800M TAM) | 🇲🇽 México ($600M TAM)</a:t>
+              <a:rPr dirty="0"/>
+              <a:t>🌎 </a:t>
+            </a:r>
+            <a:r>
+              <a:rPr dirty="0" err="1"/>
+              <a:t>Expansión</a:t>
+            </a:r>
+            <a:r>
+              <a:rPr dirty="0"/>
+              <a:t> Año 4-5: 🇧🇷 </a:t>
+            </a:r>
+            <a:r>
+              <a:rPr dirty="0" err="1"/>
+              <a:t>Brasil</a:t>
+            </a:r>
+            <a:r>
+              <a:rPr dirty="0"/>
+              <a:t> ($</a:t>
+            </a:r>
+            <a:r>
+              <a:rPr lang="es-ES" dirty="0"/>
+              <a:t>78</a:t>
+            </a:r>
+            <a:r>
+              <a:rPr dirty="0"/>
+              <a:t>M TAM) | 🇲🇽 México ($</a:t>
+            </a:r>
+            <a:r>
+              <a:rPr lang="es-ES" dirty="0"/>
+              <a:t>468</a:t>
+            </a:r>
+            <a:r>
+              <a:rPr dirty="0"/>
+              <a:t>M TAM)</a:t>
             </a:r>
           </a:p>
         </p:txBody>
@@ -8242,7 +8674,7 @@
 </file>
 
 <file path=ppt/slides/slide8.xml><?xml version="1.0" encoding="utf-8"?>
-<p:sld xmlns:a="http://schemas.openxmlformats.org/drawingml/2006/main" xmlns:p="http://schemas.openxmlformats.org/presentationml/2006/main" xmlns:r="http://schemas.openxmlformats.org/officeDocument/2006/relationships">
+<p:sld xmlns:a="http://schemas.openxmlformats.org/drawingml/2006/main" xmlns:r="http://schemas.openxmlformats.org/officeDocument/2006/relationships" xmlns:p="http://schemas.openxmlformats.org/presentationml/2006/main">
   <p:cSld>
     <p:spTree>
       <p:nvGrpSpPr>
@@ -8250,7 +8682,14 @@
         <p:cNvGrpSpPr/>
         <p:nvPr/>
       </p:nvGrpSpPr>
-      <p:grpSpPr/>
+      <p:grpSpPr>
+        <a:xfrm>
+          <a:off x="0" y="0"/>
+          <a:ext cx="0" cy="0"/>
+          <a:chOff x="0" y="0"/>
+          <a:chExt cx="0" cy="0"/>
+        </a:xfrm>
+      </p:grpSpPr>
       <p:sp>
         <p:nvSpPr>
           <p:cNvPr id="2" name="TextBox 1"/>
@@ -8622,6 +9061,7 @@
           <a:lstStyle/>
           <a:p>
             <a:pPr algn="ctr"/>
+            <a:endParaRPr/>
           </a:p>
         </p:txBody>
       </p:sp>
@@ -8764,6 +9204,7 @@
           <a:lstStyle/>
           <a:p>
             <a:pPr algn="ctr"/>
+            <a:endParaRPr/>
           </a:p>
         </p:txBody>
       </p:sp>
@@ -8906,6 +9347,7 @@
           <a:lstStyle/>
           <a:p>
             <a:pPr algn="ctr"/>
+            <a:endParaRPr/>
           </a:p>
         </p:txBody>
       </p:sp>
@@ -9048,6 +9490,7 @@
           <a:lstStyle/>
           <a:p>
             <a:pPr algn="ctr"/>
+            <a:endParaRPr/>
           </a:p>
         </p:txBody>
       </p:sp>
@@ -9190,6 +9633,7 @@
           <a:lstStyle/>
           <a:p>
             <a:pPr algn="ctr"/>
+            <a:endParaRPr/>
           </a:p>
         </p:txBody>
       </p:sp>
@@ -9303,7 +9747,7 @@
 </file>
 
 <file path=ppt/slides/slide9.xml><?xml version="1.0" encoding="utf-8"?>
-<p:sld xmlns:a="http://schemas.openxmlformats.org/drawingml/2006/main" xmlns:p="http://schemas.openxmlformats.org/presentationml/2006/main" xmlns:r="http://schemas.openxmlformats.org/officeDocument/2006/relationships">
+<p:sld xmlns:a="http://schemas.openxmlformats.org/drawingml/2006/main" xmlns:r="http://schemas.openxmlformats.org/officeDocument/2006/relationships" xmlns:p="http://schemas.openxmlformats.org/presentationml/2006/main">
   <p:cSld>
     <p:spTree>
       <p:nvGrpSpPr>
@@ -9311,7 +9755,14 @@
         <p:cNvGrpSpPr/>
         <p:nvPr/>
       </p:nvGrpSpPr>
-      <p:grpSpPr/>
+      <p:grpSpPr>
+        <a:xfrm>
+          <a:off x="0" y="0"/>
+          <a:ext cx="0" cy="0"/>
+          <a:chOff x="0" y="0"/>
+          <a:chExt cx="0" cy="0"/>
+        </a:xfrm>
+      </p:grpSpPr>
       <p:sp>
         <p:nvSpPr>
           <p:cNvPr id="2" name="TextBox 1"/>
@@ -9389,6 +9840,7 @@
           <a:lstStyle/>
           <a:p>
             <a:pPr algn="ctr"/>
+            <a:endParaRPr/>
           </a:p>
         </p:txBody>
       </p:sp>
@@ -9568,6 +10020,7 @@
           <a:lstStyle/>
           <a:p>
             <a:pPr algn="ctr"/>
+            <a:endParaRPr/>
           </a:p>
         </p:txBody>
       </p:sp>
@@ -9747,6 +10200,7 @@
           <a:lstStyle/>
           <a:p>
             <a:pPr algn="ctr"/>
+            <a:endParaRPr/>
           </a:p>
         </p:txBody>
       </p:sp>

</xml_diff>